<commit_message>
Small changes (title, corr plot)
</commit_message>
<xml_diff>
--- a/6101 Group Project New Version_Jichong_3.20.pptx
+++ b/6101 Group Project New Version_Jichong_3.20.pptx
@@ -17,8 +17,8 @@
     <p:sldId id="259" r:id="rId11"/>
     <p:sldId id="263" r:id="rId12"/>
     <p:sldId id="269" r:id="rId13"/>
-    <p:sldId id="268" r:id="rId14"/>
-    <p:sldId id="264" r:id="rId15"/>
+    <p:sldId id="264" r:id="rId14"/>
+    <p:sldId id="268" r:id="rId15"/>
     <p:sldId id="267" r:id="rId16"/>
     <p:sldId id="270" r:id="rId17"/>
     <p:sldId id="271" r:id="rId18"/>
@@ -145,8 +145,8 @@
             <p14:sldId id="259"/>
             <p14:sldId id="263"/>
             <p14:sldId id="269"/>
+            <p14:sldId id="264"/>
             <p14:sldId id="268"/>
-            <p14:sldId id="264"/>
             <p14:sldId id="267"/>
             <p14:sldId id="270"/>
             <p14:sldId id="271"/>
@@ -167,6 +167,387 @@
     </p:ext>
   </p:extLst>
 </p:presentation>
+</file>
+
+<file path=ppt/changesInfos/changesInfo1.xml><?xml version="1.0" encoding="utf-8"?>
+<pc:chgInfo xmlns:a="http://schemas.openxmlformats.org/drawingml/2006/main" xmlns:r="http://schemas.openxmlformats.org/officeDocument/2006/relationships" xmlns:ac="http://schemas.microsoft.com/office/drawing/2013/main/command" xmlns:pc="http://schemas.microsoft.com/office/powerpoint/2013/main/command">
+  <pc:docChgLst>
+    <pc:chgData name="Bradley Reardon" userId="a17d7f7e761d2a81" providerId="LiveId" clId="{5002F829-7E52-4D44-A838-F5EB72B24A15}"/>
+    <pc:docChg chg="undo custSel modSld sldOrd">
+      <pc:chgData name="Bradley Reardon" userId="a17d7f7e761d2a81" providerId="LiveId" clId="{5002F829-7E52-4D44-A838-F5EB72B24A15}" dt="2021-03-20T18:52:27.930" v="388" actId="1076"/>
+      <pc:docMkLst>
+        <pc:docMk/>
+      </pc:docMkLst>
+      <pc:sldChg chg="modSp mod">
+        <pc:chgData name="Bradley Reardon" userId="a17d7f7e761d2a81" providerId="LiveId" clId="{5002F829-7E52-4D44-A838-F5EB72B24A15}" dt="2021-03-20T17:51:40.141" v="200" actId="108"/>
+        <pc:sldMkLst>
+          <pc:docMk/>
+          <pc:sldMk cId="1241395330" sldId="257"/>
+        </pc:sldMkLst>
+        <pc:spChg chg="mod">
+          <ac:chgData name="Bradley Reardon" userId="a17d7f7e761d2a81" providerId="LiveId" clId="{5002F829-7E52-4D44-A838-F5EB72B24A15}" dt="2021-03-20T17:51:40.141" v="200" actId="108"/>
+          <ac:spMkLst>
+            <pc:docMk/>
+            <pc:sldMk cId="1241395330" sldId="257"/>
+            <ac:spMk id="3" creationId="{A9456917-9AC3-442F-9196-7B4ED4C00CAF}"/>
+          </ac:spMkLst>
+        </pc:spChg>
+      </pc:sldChg>
+      <pc:sldChg chg="modSp mod">
+        <pc:chgData name="Bradley Reardon" userId="a17d7f7e761d2a81" providerId="LiveId" clId="{5002F829-7E52-4D44-A838-F5EB72B24A15}" dt="2021-03-20T17:29:56.117" v="64" actId="20577"/>
+        <pc:sldMkLst>
+          <pc:docMk/>
+          <pc:sldMk cId="3045140544" sldId="258"/>
+        </pc:sldMkLst>
+        <pc:spChg chg="mod">
+          <ac:chgData name="Bradley Reardon" userId="a17d7f7e761d2a81" providerId="LiveId" clId="{5002F829-7E52-4D44-A838-F5EB72B24A15}" dt="2021-03-20T17:29:56.117" v="64" actId="20577"/>
+          <ac:spMkLst>
+            <pc:docMk/>
+            <pc:sldMk cId="3045140544" sldId="258"/>
+            <ac:spMk id="3" creationId="{FC16C673-17DA-40DF-BCAD-5A4D7BEB7351}"/>
+          </ac:spMkLst>
+        </pc:spChg>
+      </pc:sldChg>
+      <pc:sldChg chg="addSp delSp modSp mod">
+        <pc:chgData name="Bradley Reardon" userId="a17d7f7e761d2a81" providerId="LiveId" clId="{5002F829-7E52-4D44-A838-F5EB72B24A15}" dt="2021-03-20T17:49:16.088" v="117" actId="1076"/>
+        <pc:sldMkLst>
+          <pc:docMk/>
+          <pc:sldMk cId="2041492678" sldId="263"/>
+        </pc:sldMkLst>
+        <pc:spChg chg="add del mod">
+          <ac:chgData name="Bradley Reardon" userId="a17d7f7e761d2a81" providerId="LiveId" clId="{5002F829-7E52-4D44-A838-F5EB72B24A15}" dt="2021-03-20T17:32:55.271" v="70" actId="478"/>
+          <ac:spMkLst>
+            <pc:docMk/>
+            <pc:sldMk cId="2041492678" sldId="263"/>
+            <ac:spMk id="3" creationId="{086EBA36-FF68-46F9-A101-58F857F51EA9}"/>
+          </ac:spMkLst>
+        </pc:spChg>
+        <pc:picChg chg="mod">
+          <ac:chgData name="Bradley Reardon" userId="a17d7f7e761d2a81" providerId="LiveId" clId="{5002F829-7E52-4D44-A838-F5EB72B24A15}" dt="2021-03-20T17:49:16.088" v="117" actId="1076"/>
+          <ac:picMkLst>
+            <pc:docMk/>
+            <pc:sldMk cId="2041492678" sldId="263"/>
+            <ac:picMk id="4" creationId="{C1BF5DFF-CFD9-44B1-A2ED-53A9D205ED30}"/>
+          </ac:picMkLst>
+        </pc:picChg>
+      </pc:sldChg>
+      <pc:sldChg chg="addSp delSp modSp mod">
+        <pc:chgData name="Bradley Reardon" userId="a17d7f7e761d2a81" providerId="LiveId" clId="{5002F829-7E52-4D44-A838-F5EB72B24A15}" dt="2021-03-20T18:52:27.930" v="388" actId="1076"/>
+        <pc:sldMkLst>
+          <pc:docMk/>
+          <pc:sldMk cId="271426853" sldId="264"/>
+        </pc:sldMkLst>
+        <pc:spChg chg="mod">
+          <ac:chgData name="Bradley Reardon" userId="a17d7f7e761d2a81" providerId="LiveId" clId="{5002F829-7E52-4D44-A838-F5EB72B24A15}" dt="2021-03-20T18:24:21.721" v="274" actId="20577"/>
+          <ac:spMkLst>
+            <pc:docMk/>
+            <pc:sldMk cId="271426853" sldId="264"/>
+            <ac:spMk id="2" creationId="{5CA0080E-7511-4AC4-A8F0-C52C0455BA63}"/>
+          </ac:spMkLst>
+        </pc:spChg>
+        <pc:spChg chg="add del mod">
+          <ac:chgData name="Bradley Reardon" userId="a17d7f7e761d2a81" providerId="LiveId" clId="{5002F829-7E52-4D44-A838-F5EB72B24A15}" dt="2021-03-20T18:28:55.164" v="278" actId="478"/>
+          <ac:spMkLst>
+            <pc:docMk/>
+            <pc:sldMk cId="271426853" sldId="264"/>
+            <ac:spMk id="16" creationId="{2C092319-A691-4A25-AE4F-57310CE862AE}"/>
+          </ac:spMkLst>
+        </pc:spChg>
+        <pc:picChg chg="add del mod">
+          <ac:chgData name="Bradley Reardon" userId="a17d7f7e761d2a81" providerId="LiveId" clId="{5002F829-7E52-4D44-A838-F5EB72B24A15}" dt="2021-03-20T17:43:23.391" v="101" actId="22"/>
+          <ac:picMkLst>
+            <pc:docMk/>
+            <pc:sldMk cId="271426853" sldId="264"/>
+            <ac:picMk id="4" creationId="{4A232B36-A77B-4FEF-B8F0-55F9AABE5CC7}"/>
+          </ac:picMkLst>
+        </pc:picChg>
+        <pc:picChg chg="del">
+          <ac:chgData name="Bradley Reardon" userId="a17d7f7e761d2a81" providerId="LiveId" clId="{5002F829-7E52-4D44-A838-F5EB72B24A15}" dt="2021-03-20T18:28:52.051" v="275" actId="478"/>
+          <ac:picMkLst>
+            <pc:docMk/>
+            <pc:sldMk cId="271426853" sldId="264"/>
+            <ac:picMk id="5" creationId="{CFDCA03D-E2EA-48E9-B886-492475873189}"/>
+          </ac:picMkLst>
+        </pc:picChg>
+        <pc:picChg chg="del">
+          <ac:chgData name="Bradley Reardon" userId="a17d7f7e761d2a81" providerId="LiveId" clId="{5002F829-7E52-4D44-A838-F5EB72B24A15}" dt="2021-03-20T18:28:52.531" v="276" actId="478"/>
+          <ac:picMkLst>
+            <pc:docMk/>
+            <pc:sldMk cId="271426853" sldId="264"/>
+            <ac:picMk id="7" creationId="{39153F6A-22DD-421B-8678-9B88355ABE7C}"/>
+          </ac:picMkLst>
+        </pc:picChg>
+        <pc:picChg chg="add del mod">
+          <ac:chgData name="Bradley Reardon" userId="a17d7f7e761d2a81" providerId="LiveId" clId="{5002F829-7E52-4D44-A838-F5EB72B24A15}" dt="2021-03-20T17:46:44.435" v="106" actId="478"/>
+          <ac:picMkLst>
+            <pc:docMk/>
+            <pc:sldMk cId="271426853" sldId="264"/>
+            <ac:picMk id="8" creationId="{B99A1D77-149B-45EA-9D84-FF03B730468E}"/>
+          </ac:picMkLst>
+        </pc:picChg>
+        <pc:picChg chg="del">
+          <ac:chgData name="Bradley Reardon" userId="a17d7f7e761d2a81" providerId="LiveId" clId="{5002F829-7E52-4D44-A838-F5EB72B24A15}" dt="2021-03-20T18:28:52.973" v="277" actId="478"/>
+          <ac:picMkLst>
+            <pc:docMk/>
+            <pc:sldMk cId="271426853" sldId="264"/>
+            <ac:picMk id="9" creationId="{A260FDCF-1BE9-47F8-AAAA-E61A5251A1C0}"/>
+          </ac:picMkLst>
+        </pc:picChg>
+        <pc:picChg chg="del">
+          <ac:chgData name="Bradley Reardon" userId="a17d7f7e761d2a81" providerId="LiveId" clId="{5002F829-7E52-4D44-A838-F5EB72B24A15}" dt="2021-03-20T18:28:55.708" v="279" actId="478"/>
+          <ac:picMkLst>
+            <pc:docMk/>
+            <pc:sldMk cId="271426853" sldId="264"/>
+            <ac:picMk id="11" creationId="{A91E4C0F-5C35-40D6-98DA-2D1481C67622}"/>
+          </ac:picMkLst>
+        </pc:picChg>
+        <pc:picChg chg="add mod">
+          <ac:chgData name="Bradley Reardon" userId="a17d7f7e761d2a81" providerId="LiveId" clId="{5002F829-7E52-4D44-A838-F5EB72B24A15}" dt="2021-03-20T18:31:35.989" v="323" actId="1076"/>
+          <ac:picMkLst>
+            <pc:docMk/>
+            <pc:sldMk cId="271426853" sldId="264"/>
+            <ac:picMk id="12" creationId="{8D222DA7-075D-48E1-8639-A6FC29485211}"/>
+          </ac:picMkLst>
+        </pc:picChg>
+        <pc:picChg chg="del mod">
+          <ac:chgData name="Bradley Reardon" userId="a17d7f7e761d2a81" providerId="LiveId" clId="{5002F829-7E52-4D44-A838-F5EB72B24A15}" dt="2021-03-20T18:28:56.084" v="280" actId="478"/>
+          <ac:picMkLst>
+            <pc:docMk/>
+            <pc:sldMk cId="271426853" sldId="264"/>
+            <ac:picMk id="13" creationId="{9D19CABD-80F3-43A6-898F-15F088955EAC}"/>
+          </ac:picMkLst>
+        </pc:picChg>
+        <pc:picChg chg="del">
+          <ac:chgData name="Bradley Reardon" userId="a17d7f7e761d2a81" providerId="LiveId" clId="{5002F829-7E52-4D44-A838-F5EB72B24A15}" dt="2021-03-20T17:43:51.810" v="104" actId="478"/>
+          <ac:picMkLst>
+            <pc:docMk/>
+            <pc:sldMk cId="271426853" sldId="264"/>
+            <ac:picMk id="15" creationId="{FC95E5A5-50A6-440C-A5AF-D691F8AA91E1}"/>
+          </ac:picMkLst>
+        </pc:picChg>
+        <pc:picChg chg="add mod">
+          <ac:chgData name="Bradley Reardon" userId="a17d7f7e761d2a81" providerId="LiveId" clId="{5002F829-7E52-4D44-A838-F5EB72B24A15}" dt="2021-03-20T18:52:25.596" v="387" actId="1076"/>
+          <ac:picMkLst>
+            <pc:docMk/>
+            <pc:sldMk cId="271426853" sldId="264"/>
+            <ac:picMk id="18" creationId="{AE2A6F9E-3854-4DE1-A5F3-DD3CBEF7415E}"/>
+          </ac:picMkLst>
+        </pc:picChg>
+        <pc:picChg chg="add mod">
+          <ac:chgData name="Bradley Reardon" userId="a17d7f7e761d2a81" providerId="LiveId" clId="{5002F829-7E52-4D44-A838-F5EB72B24A15}" dt="2021-03-20T18:52:23.238" v="386" actId="1076"/>
+          <ac:picMkLst>
+            <pc:docMk/>
+            <pc:sldMk cId="271426853" sldId="264"/>
+            <ac:picMk id="20" creationId="{1614750A-1CD9-4EFB-B079-B7C3A55338D3}"/>
+          </ac:picMkLst>
+        </pc:picChg>
+        <pc:picChg chg="add mod">
+          <ac:chgData name="Bradley Reardon" userId="a17d7f7e761d2a81" providerId="LiveId" clId="{5002F829-7E52-4D44-A838-F5EB72B24A15}" dt="2021-03-20T18:52:27.930" v="388" actId="1076"/>
+          <ac:picMkLst>
+            <pc:docMk/>
+            <pc:sldMk cId="271426853" sldId="264"/>
+            <ac:picMk id="22" creationId="{F0B00652-3C67-443D-8BCF-B6CC71F1A360}"/>
+          </ac:picMkLst>
+        </pc:picChg>
+        <pc:picChg chg="add mod">
+          <ac:chgData name="Bradley Reardon" userId="a17d7f7e761d2a81" providerId="LiveId" clId="{5002F829-7E52-4D44-A838-F5EB72B24A15}" dt="2021-03-20T18:52:22.281" v="385" actId="1076"/>
+          <ac:picMkLst>
+            <pc:docMk/>
+            <pc:sldMk cId="271426853" sldId="264"/>
+            <ac:picMk id="24" creationId="{17D274B8-6DF1-46AD-9DD7-9E7632ED2F46}"/>
+          </ac:picMkLst>
+        </pc:picChg>
+        <pc:picChg chg="add mod">
+          <ac:chgData name="Bradley Reardon" userId="a17d7f7e761d2a81" providerId="LiveId" clId="{5002F829-7E52-4D44-A838-F5EB72B24A15}" dt="2021-03-20T18:31:20.845" v="317" actId="1076"/>
+          <ac:picMkLst>
+            <pc:docMk/>
+            <pc:sldMk cId="271426853" sldId="264"/>
+            <ac:picMk id="26" creationId="{72310D4E-DE77-4CD3-8E0A-162AA233CE80}"/>
+          </ac:picMkLst>
+        </pc:picChg>
+      </pc:sldChg>
+      <pc:sldChg chg="addSp delSp modSp mod ord">
+        <pc:chgData name="Bradley Reardon" userId="a17d7f7e761d2a81" providerId="LiveId" clId="{5002F829-7E52-4D44-A838-F5EB72B24A15}" dt="2021-03-20T18:37:24.193" v="361" actId="1076"/>
+        <pc:sldMkLst>
+          <pc:docMk/>
+          <pc:sldMk cId="1418613357" sldId="268"/>
+        </pc:sldMkLst>
+        <pc:spChg chg="del mod">
+          <ac:chgData name="Bradley Reardon" userId="a17d7f7e761d2a81" providerId="LiveId" clId="{5002F829-7E52-4D44-A838-F5EB72B24A15}" dt="2021-03-20T17:33:33.996" v="72" actId="478"/>
+          <ac:spMkLst>
+            <pc:docMk/>
+            <pc:sldMk cId="1418613357" sldId="268"/>
+            <ac:spMk id="5" creationId="{B20BCF63-08D7-4EF8-893D-BE7D2255880D}"/>
+          </ac:spMkLst>
+        </pc:spChg>
+        <pc:picChg chg="add del mod">
+          <ac:chgData name="Bradley Reardon" userId="a17d7f7e761d2a81" providerId="LiveId" clId="{5002F829-7E52-4D44-A838-F5EB72B24A15}" dt="2021-03-20T18:03:27.456" v="205" actId="478"/>
+          <ac:picMkLst>
+            <pc:docMk/>
+            <pc:sldMk cId="1418613357" sldId="268"/>
+            <ac:picMk id="4" creationId="{6A5105B3-B9C3-478D-A97F-4DB77A29DAE6}"/>
+          </ac:picMkLst>
+        </pc:picChg>
+        <pc:picChg chg="del">
+          <ac:chgData name="Bradley Reardon" userId="a17d7f7e761d2a81" providerId="LiveId" clId="{5002F829-7E52-4D44-A838-F5EB72B24A15}" dt="2021-03-20T18:05:03.954" v="209" actId="478"/>
+          <ac:picMkLst>
+            <pc:docMk/>
+            <pc:sldMk cId="1418613357" sldId="268"/>
+            <ac:picMk id="6" creationId="{96075AAB-4ED1-4941-BEE1-BB17FDC82CAC}"/>
+          </ac:picMkLst>
+        </pc:picChg>
+        <pc:picChg chg="del">
+          <ac:chgData name="Bradley Reardon" userId="a17d7f7e761d2a81" providerId="LiveId" clId="{5002F829-7E52-4D44-A838-F5EB72B24A15}" dt="2021-03-20T18:01:56.520" v="201" actId="478"/>
+          <ac:picMkLst>
+            <pc:docMk/>
+            <pc:sldMk cId="1418613357" sldId="268"/>
+            <ac:picMk id="8" creationId="{B373CCDB-9F17-419A-8EBE-EB333E168C3C}"/>
+          </ac:picMkLst>
+        </pc:picChg>
+        <pc:picChg chg="add del mod">
+          <ac:chgData name="Bradley Reardon" userId="a17d7f7e761d2a81" providerId="LiveId" clId="{5002F829-7E52-4D44-A838-F5EB72B24A15}" dt="2021-03-20T18:36:04.487" v="333" actId="478"/>
+          <ac:picMkLst>
+            <pc:docMk/>
+            <pc:sldMk cId="1418613357" sldId="268"/>
+            <ac:picMk id="9" creationId="{F286A056-A5C6-476E-BAFF-C29140DC4AF8}"/>
+          </ac:picMkLst>
+        </pc:picChg>
+        <pc:picChg chg="add del mod">
+          <ac:chgData name="Bradley Reardon" userId="a17d7f7e761d2a81" providerId="LiveId" clId="{5002F829-7E52-4D44-A838-F5EB72B24A15}" dt="2021-03-20T18:36:04.047" v="332" actId="478"/>
+          <ac:picMkLst>
+            <pc:docMk/>
+            <pc:sldMk cId="1418613357" sldId="268"/>
+            <ac:picMk id="11" creationId="{3C685CAC-D65D-45C1-92FD-6AAFDBA41586}"/>
+          </ac:picMkLst>
+        </pc:picChg>
+        <pc:picChg chg="add del">
+          <ac:chgData name="Bradley Reardon" userId="a17d7f7e761d2a81" providerId="LiveId" clId="{5002F829-7E52-4D44-A838-F5EB72B24A15}" dt="2021-03-20T18:36:36.298" v="337" actId="478"/>
+          <ac:picMkLst>
+            <pc:docMk/>
+            <pc:sldMk cId="1418613357" sldId="268"/>
+            <ac:picMk id="13" creationId="{0962D777-4C16-4EA0-AC71-19DBD9404E04}"/>
+          </ac:picMkLst>
+        </pc:picChg>
+        <pc:picChg chg="add mod">
+          <ac:chgData name="Bradley Reardon" userId="a17d7f7e761d2a81" providerId="LiveId" clId="{5002F829-7E52-4D44-A838-F5EB72B24A15}" dt="2021-03-20T18:37:23.028" v="360" actId="1076"/>
+          <ac:picMkLst>
+            <pc:docMk/>
+            <pc:sldMk cId="1418613357" sldId="268"/>
+            <ac:picMk id="15" creationId="{1E29D9E2-0608-499B-BFA7-BE12F36FCCA3}"/>
+          </ac:picMkLst>
+        </pc:picChg>
+        <pc:picChg chg="add mod">
+          <ac:chgData name="Bradley Reardon" userId="a17d7f7e761d2a81" providerId="LiveId" clId="{5002F829-7E52-4D44-A838-F5EB72B24A15}" dt="2021-03-20T18:37:24.193" v="361" actId="1076"/>
+          <ac:picMkLst>
+            <pc:docMk/>
+            <pc:sldMk cId="1418613357" sldId="268"/>
+            <ac:picMk id="17" creationId="{85239267-7266-4201-9FA5-3B409359A8A1}"/>
+          </ac:picMkLst>
+        </pc:picChg>
+      </pc:sldChg>
+      <pc:sldChg chg="addSp delSp modSp mod">
+        <pc:chgData name="Bradley Reardon" userId="a17d7f7e761d2a81" providerId="LiveId" clId="{5002F829-7E52-4D44-A838-F5EB72B24A15}" dt="2021-03-20T18:07:36.327" v="259" actId="1076"/>
+        <pc:sldMkLst>
+          <pc:docMk/>
+          <pc:sldMk cId="3317791480" sldId="269"/>
+        </pc:sldMkLst>
+        <pc:spChg chg="add del mod">
+          <ac:chgData name="Bradley Reardon" userId="a17d7f7e761d2a81" providerId="LiveId" clId="{5002F829-7E52-4D44-A838-F5EB72B24A15}" dt="2021-03-20T17:49:00.698" v="112" actId="478"/>
+          <ac:spMkLst>
+            <pc:docMk/>
+            <pc:sldMk cId="3317791480" sldId="269"/>
+            <ac:spMk id="4" creationId="{D0BF3BC4-F2E4-4A28-9957-DECD7B524D1D}"/>
+          </ac:spMkLst>
+        </pc:spChg>
+        <pc:picChg chg="del">
+          <ac:chgData name="Bradley Reardon" userId="a17d7f7e761d2a81" providerId="LiveId" clId="{5002F829-7E52-4D44-A838-F5EB72B24A15}" dt="2021-03-20T17:48:57.048" v="111" actId="478"/>
+          <ac:picMkLst>
+            <pc:docMk/>
+            <pc:sldMk cId="3317791480" sldId="269"/>
+            <ac:picMk id="5" creationId="{988679DF-7C22-4D0B-86F8-6FA4455CEE36}"/>
+          </ac:picMkLst>
+        </pc:picChg>
+        <pc:picChg chg="add mod">
+          <ac:chgData name="Bradley Reardon" userId="a17d7f7e761d2a81" providerId="LiveId" clId="{5002F829-7E52-4D44-A838-F5EB72B24A15}" dt="2021-03-20T18:07:36.327" v="259" actId="1076"/>
+          <ac:picMkLst>
+            <pc:docMk/>
+            <pc:sldMk cId="3317791480" sldId="269"/>
+            <ac:picMk id="7" creationId="{24445A92-3C0E-4BBF-927E-BC09DAA108E6}"/>
+          </ac:picMkLst>
+        </pc:picChg>
+      </pc:sldChg>
+      <pc:sldChg chg="addSp delSp modSp mod">
+        <pc:chgData name="Bradley Reardon" userId="a17d7f7e761d2a81" providerId="LiveId" clId="{5002F829-7E52-4D44-A838-F5EB72B24A15}" dt="2021-03-20T18:51:42.203" v="384" actId="14100"/>
+        <pc:sldMkLst>
+          <pc:docMk/>
+          <pc:sldMk cId="1227895248" sldId="270"/>
+        </pc:sldMkLst>
+        <pc:spChg chg="mod">
+          <ac:chgData name="Bradley Reardon" userId="a17d7f7e761d2a81" providerId="LiveId" clId="{5002F829-7E52-4D44-A838-F5EB72B24A15}" dt="2021-03-20T18:07:19.833" v="256" actId="20577"/>
+          <ac:spMkLst>
+            <pc:docMk/>
+            <pc:sldMk cId="1227895248" sldId="270"/>
+            <ac:spMk id="2" creationId="{24DD0466-E028-4D61-915F-A3B33B7ACE86}"/>
+          </ac:spMkLst>
+        </pc:spChg>
+        <pc:picChg chg="add del mod">
+          <ac:chgData name="Bradley Reardon" userId="a17d7f7e761d2a81" providerId="LiveId" clId="{5002F829-7E52-4D44-A838-F5EB72B24A15}" dt="2021-03-20T18:50:41.304" v="371" actId="478"/>
+          <ac:picMkLst>
+            <pc:docMk/>
+            <pc:sldMk cId="1227895248" sldId="270"/>
+            <ac:picMk id="5" creationId="{CC169A23-02DD-4075-994E-98BBDB963AEE}"/>
+          </ac:picMkLst>
+        </pc:picChg>
+        <pc:picChg chg="add del mod">
+          <ac:chgData name="Bradley Reardon" userId="a17d7f7e761d2a81" providerId="LiveId" clId="{5002F829-7E52-4D44-A838-F5EB72B24A15}" dt="2021-03-20T18:51:24.644" v="382" actId="478"/>
+          <ac:picMkLst>
+            <pc:docMk/>
+            <pc:sldMk cId="1227895248" sldId="270"/>
+            <ac:picMk id="6" creationId="{6AC56838-18F4-42BC-B009-004A6FA64DA0}"/>
+          </ac:picMkLst>
+        </pc:picChg>
+        <pc:picChg chg="add mod">
+          <ac:chgData name="Bradley Reardon" userId="a17d7f7e761d2a81" providerId="LiveId" clId="{5002F829-7E52-4D44-A838-F5EB72B24A15}" dt="2021-03-20T18:51:42.203" v="384" actId="14100"/>
+          <ac:picMkLst>
+            <pc:docMk/>
+            <pc:sldMk cId="1227895248" sldId="270"/>
+            <ac:picMk id="8" creationId="{12A1FF45-92DE-440E-9399-42C8B3A3DE1C}"/>
+          </ac:picMkLst>
+        </pc:picChg>
+      </pc:sldChg>
+      <pc:sldChg chg="modSp mod">
+        <pc:chgData name="Bradley Reardon" userId="a17d7f7e761d2a81" providerId="LiveId" clId="{5002F829-7E52-4D44-A838-F5EB72B24A15}" dt="2021-03-20T18:08:30.136" v="263" actId="20577"/>
+        <pc:sldMkLst>
+          <pc:docMk/>
+          <pc:sldMk cId="2239328636" sldId="276"/>
+        </pc:sldMkLst>
+        <pc:spChg chg="mod">
+          <ac:chgData name="Bradley Reardon" userId="a17d7f7e761d2a81" providerId="LiveId" clId="{5002F829-7E52-4D44-A838-F5EB72B24A15}" dt="2021-03-20T18:08:30.136" v="263" actId="20577"/>
+          <ac:spMkLst>
+            <pc:docMk/>
+            <pc:sldMk cId="2239328636" sldId="276"/>
+            <ac:spMk id="2" creationId="{757C6CF1-9FEC-4B61-8664-9E66B5FD090A}"/>
+          </ac:spMkLst>
+        </pc:spChg>
+      </pc:sldChg>
+      <pc:sldChg chg="modSp mod">
+        <pc:chgData name="Bradley Reardon" userId="a17d7f7e761d2a81" providerId="LiveId" clId="{5002F829-7E52-4D44-A838-F5EB72B24A15}" dt="2021-03-20T17:36:33.470" v="84" actId="20577"/>
+        <pc:sldMkLst>
+          <pc:docMk/>
+          <pc:sldMk cId="2025065564" sldId="277"/>
+        </pc:sldMkLst>
+        <pc:spChg chg="mod">
+          <ac:chgData name="Bradley Reardon" userId="a17d7f7e761d2a81" providerId="LiveId" clId="{5002F829-7E52-4D44-A838-F5EB72B24A15}" dt="2021-03-20T17:36:33.470" v="84" actId="20577"/>
+          <ac:spMkLst>
+            <pc:docMk/>
+            <pc:sldMk cId="2025065564" sldId="277"/>
+            <ac:spMk id="2" creationId="{757C6CF1-9FEC-4B61-8664-9E66B5FD090A}"/>
+          </ac:spMkLst>
+        </pc:spChg>
+      </pc:sldChg>
+    </pc:docChg>
+  </pc:docChgLst>
+</pc:chgInfo>
 </file>
 
 <file path=ppt/slideLayouts/slideLayout1.xml><?xml version="1.0" encoding="utf-8"?>
@@ -6876,31 +7257,6 @@
           </a:p>
         </p:txBody>
       </p:sp>
-      <p:sp>
-        <p:nvSpPr>
-          <p:cNvPr id="3" name="Content Placeholder 2">
-            <a:extLst>
-              <a:ext uri="{FF2B5EF4-FFF2-40B4-BE49-F238E27FC236}">
-                <a16:creationId xmlns:a16="http://schemas.microsoft.com/office/drawing/2014/main" id="{086EBA36-FF68-46F9-A101-58F857F51EA9}"/>
-              </a:ext>
-            </a:extLst>
-          </p:cNvPr>
-          <p:cNvSpPr>
-            <a:spLocks noGrp="1"/>
-          </p:cNvSpPr>
-          <p:nvPr>
-            <p:ph idx="1"/>
-          </p:nvPr>
-        </p:nvSpPr>
-        <p:spPr/>
-        <p:txBody>
-          <a:bodyPr/>
-          <a:lstStyle/>
-          <a:p>
-            <a:endParaRPr lang="en-US"/>
-          </a:p>
-        </p:txBody>
-      </p:sp>
       <p:pic>
         <p:nvPicPr>
           <p:cNvPr id="4" name="Picture 3">
@@ -6928,8 +7284,8 @@
         </p:blipFill>
         <p:spPr bwMode="auto">
           <a:xfrm>
-            <a:off x="677334" y="2146210"/>
-            <a:ext cx="8382690" cy="4102190"/>
+            <a:off x="1914312" y="2125014"/>
+            <a:ext cx="6122712" cy="4123386"/>
           </a:xfrm>
           <a:prstGeom prst="rect">
             <a:avLst/>
@@ -7000,19 +7356,17 @@
       </p:sp>
       <p:pic>
         <p:nvPicPr>
-          <p:cNvPr id="5" name="Content Placeholder 4">
+          <p:cNvPr id="7" name="Picture 6">
             <a:extLst>
               <a:ext uri="{FF2B5EF4-FFF2-40B4-BE49-F238E27FC236}">
-                <a16:creationId xmlns:a16="http://schemas.microsoft.com/office/drawing/2014/main" id="{988679DF-7C22-4D0B-86F8-6FA4455CEE36}"/>
+                <a16:creationId xmlns:a16="http://schemas.microsoft.com/office/drawing/2014/main" id="{24445A92-3C0E-4BBF-927E-BC09DAA108E6}"/>
               </a:ext>
             </a:extLst>
           </p:cNvPr>
           <p:cNvPicPr>
-            <a:picLocks noGrp="1" noChangeAspect="1"/>
+            <a:picLocks noChangeAspect="1"/>
           </p:cNvPicPr>
-          <p:nvPr>
-            <p:ph idx="1"/>
-          </p:nvPr>
+          <p:nvPr/>
         </p:nvPicPr>
         <p:blipFill>
           <a:blip r:embed="rId2"/>
@@ -7022,9 +7376,12 @@
         </p:blipFill>
         <p:spPr>
           <a:xfrm>
-            <a:off x="524935" y="1930400"/>
-            <a:ext cx="9743016" cy="4791569"/>
+            <a:off x="1632393" y="2071486"/>
+            <a:ext cx="6686550" cy="4286250"/>
           </a:xfrm>
+          <a:prstGeom prst="rect">
+            <a:avLst/>
+          </a:prstGeom>
         </p:spPr>
       </p:pic>
     </p:spTree>
@@ -7062,7 +7419,7 @@
           <p:cNvPr id="2" name="Title 1">
             <a:extLst>
               <a:ext uri="{FF2B5EF4-FFF2-40B4-BE49-F238E27FC236}">
-                <a16:creationId xmlns:a16="http://schemas.microsoft.com/office/drawing/2014/main" id="{AAA023A3-C580-49F7-8ED6-A426CD016C0F}"/>
+                <a16:creationId xmlns:a16="http://schemas.microsoft.com/office/drawing/2014/main" id="{5CA0080E-7511-4AC4-A8F0-C52C0455BA63}"/>
               </a:ext>
             </a:extLst>
           </p:cNvPr>
@@ -7075,8 +7432,8 @@
         </p:nvSpPr>
         <p:spPr>
           <a:xfrm>
-            <a:off x="677333" y="376335"/>
-            <a:ext cx="10071531" cy="1320800"/>
+            <a:off x="490722" y="150013"/>
+            <a:ext cx="8596668" cy="1320800"/>
           </a:xfrm>
         </p:spPr>
         <p:txBody>
@@ -7089,66 +7446,61 @@
                 <a:ea typeface="DengXian" panose="02010600030101010101" pitchFamily="2" charset="-122"/>
                 <a:cs typeface="Times New Roman" panose="02020603050405020304" pitchFamily="18" charset="0"/>
               </a:rPr>
-              <a:t>Total </a:t>
+              <a:t>Mean</a:t>
+            </a:r>
+            <a:r>
+              <a:rPr lang="en-US" sz="3600" dirty="0">
+                <a:latin typeface="Calibri" panose="020F0502020204030204" pitchFamily="34" charset="0"/>
+                <a:ea typeface="DengXian" panose="02010600030101010101" pitchFamily="2" charset="-122"/>
+                <a:cs typeface="Times New Roman" panose="02020603050405020304" pitchFamily="18" charset="0"/>
+              </a:rPr>
+              <a:t> </a:t>
             </a:r>
             <a:r>
               <a:rPr lang="en-US" dirty="0">
-                <a:effectLst/>
-                <a:latin typeface="Calibri" panose="020F0502020204030204" pitchFamily="34" charset="0"/>
-                <a:ea typeface="DengXian" panose="02010600030101010101" pitchFamily="2" charset="-122"/>
-                <a:cs typeface="Times New Roman" panose="02020603050405020304" pitchFamily="18" charset="0"/>
-              </a:rPr>
-              <a:t>solar energy production potential by region – chart3 </a:t>
+                <a:latin typeface="Calibri" panose="020F0502020204030204" pitchFamily="34" charset="0"/>
+                <a:ea typeface="DengXian" panose="02010600030101010101" pitchFamily="2" charset="-122"/>
+                <a:cs typeface="Times New Roman" panose="02020603050405020304" pitchFamily="18" charset="0"/>
+              </a:rPr>
+              <a:t>S</a:t>
+            </a:r>
+            <a:r>
+              <a:rPr lang="en-US" sz="3600" dirty="0">
+                <a:latin typeface="Calibri" panose="020F0502020204030204" pitchFamily="34" charset="0"/>
+                <a:ea typeface="DengXian" panose="02010600030101010101" pitchFamily="2" charset="-122"/>
+                <a:cs typeface="Times New Roman" panose="02020603050405020304" pitchFamily="18" charset="0"/>
+              </a:rPr>
+              <a:t>olar Energy Potential Generated Per </a:t>
             </a:r>
             <a:r>
               <a:rPr lang="en-US" dirty="0">
-                <a:solidFill>
-                  <a:srgbClr val="FFFF00"/>
-                </a:solidFill>
-                <a:effectLst/>
-                <a:latin typeface="Calibri" panose="020F0502020204030204" pitchFamily="34" charset="0"/>
-                <a:ea typeface="DengXian" panose="02010600030101010101" pitchFamily="2" charset="-122"/>
-                <a:cs typeface="Times New Roman" panose="02020603050405020304" pitchFamily="18" charset="0"/>
-              </a:rPr>
-              <a:t>(</a:t>
-            </a:r>
-            <a:r>
-              <a:rPr lang="en-US" dirty="0">
-                <a:solidFill>
-                  <a:srgbClr val="FFFF00"/>
-                </a:solidFill>
-                <a:latin typeface="Calibri" panose="020F0502020204030204" pitchFamily="34" charset="0"/>
-                <a:ea typeface="DengXian" panose="02010600030101010101" pitchFamily="2" charset="-122"/>
-                <a:cs typeface="Times New Roman" panose="02020603050405020304" pitchFamily="18" charset="0"/>
-              </a:rPr>
-              <a:t>Both of these two needed</a:t>
-            </a:r>
-            <a:r>
-              <a:rPr lang="en-US" dirty="0">
-                <a:solidFill>
-                  <a:srgbClr val="FFFF00"/>
-                </a:solidFill>
-                <a:effectLst/>
-                <a:latin typeface="Calibri" panose="020F0502020204030204" pitchFamily="34" charset="0"/>
-                <a:ea typeface="DengXian" panose="02010600030101010101" pitchFamily="2" charset="-122"/>
-                <a:cs typeface="Times New Roman" panose="02020603050405020304" pitchFamily="18" charset="0"/>
-              </a:rPr>
-              <a:t>)</a:t>
-            </a:r>
-            <a:endParaRPr lang="en-US" dirty="0">
-              <a:solidFill>
-                <a:srgbClr val="FFFF00"/>
-              </a:solidFill>
-            </a:endParaRPr>
+                <a:latin typeface="Calibri" panose="020F0502020204030204" pitchFamily="34" charset="0"/>
+                <a:ea typeface="DengXian" panose="02010600030101010101" pitchFamily="2" charset="-122"/>
+                <a:cs typeface="Times New Roman" panose="02020603050405020304" pitchFamily="18" charset="0"/>
+              </a:rPr>
+              <a:t>P</a:t>
+            </a:r>
+            <a:r>
+              <a:rPr lang="en-US" sz="3600" dirty="0">
+                <a:latin typeface="Calibri" panose="020F0502020204030204" pitchFamily="34" charset="0"/>
+                <a:ea typeface="DengXian" panose="02010600030101010101" pitchFamily="2" charset="-122"/>
+                <a:cs typeface="Times New Roman" panose="02020603050405020304" pitchFamily="18" charset="0"/>
+              </a:rPr>
+              <a:t>anel By Direction – </a:t>
+            </a:r>
+            <a:r>
+              <a:rPr lang="en-US" dirty="0"/>
+              <a:t>Chart 4-8</a:t>
+            </a:r>
           </a:p>
         </p:txBody>
       </p:sp>
       <p:pic>
         <p:nvPicPr>
-          <p:cNvPr id="6" name="Picture 5">
+          <p:cNvPr id="12" name="Picture 11">
             <a:extLst>
               <a:ext uri="{FF2B5EF4-FFF2-40B4-BE49-F238E27FC236}">
-                <a16:creationId xmlns:a16="http://schemas.microsoft.com/office/drawing/2014/main" id="{96075AAB-4ED1-4941-BEE1-BB17FDC82CAC}"/>
+                <a16:creationId xmlns:a16="http://schemas.microsoft.com/office/drawing/2014/main" id="{8D222DA7-075D-48E1-8639-A6FC29485211}"/>
               </a:ext>
             </a:extLst>
           </p:cNvPr>
@@ -7165,8 +7517,8 @@
         </p:blipFill>
         <p:spPr>
           <a:xfrm>
-            <a:off x="6095999" y="1939104"/>
-            <a:ext cx="5555043" cy="3471095"/>
+            <a:off x="7809107" y="4491442"/>
+            <a:ext cx="4165866" cy="1696350"/>
           </a:xfrm>
           <a:prstGeom prst="rect">
             <a:avLst/>
@@ -7175,10 +7527,10 @@
       </p:pic>
       <p:pic>
         <p:nvPicPr>
-          <p:cNvPr id="8" name="Picture 7">
+          <p:cNvPr id="18" name="Picture 17">
             <a:extLst>
               <a:ext uri="{FF2B5EF4-FFF2-40B4-BE49-F238E27FC236}">
-                <a16:creationId xmlns:a16="http://schemas.microsoft.com/office/drawing/2014/main" id="{B373CCDB-9F17-419A-8EBE-EB333E168C3C}"/>
+                <a16:creationId xmlns:a16="http://schemas.microsoft.com/office/drawing/2014/main" id="{AE2A6F9E-3854-4DE1-A5F3-DD3CBEF7415E}"/>
               </a:ext>
             </a:extLst>
           </p:cNvPr>
@@ -7195,48 +7547,138 @@
         </p:blipFill>
         <p:spPr>
           <a:xfrm>
-            <a:off x="313668" y="1939104"/>
-            <a:ext cx="5602694" cy="3471095"/>
+            <a:off x="100019" y="1518383"/>
+            <a:ext cx="3693554" cy="2257171"/>
           </a:xfrm>
           <a:prstGeom prst="rect">
             <a:avLst/>
           </a:prstGeom>
         </p:spPr>
       </p:pic>
-      <p:sp>
-        <p:nvSpPr>
-          <p:cNvPr id="5" name="Content Placeholder 4">
+      <p:pic>
+        <p:nvPicPr>
+          <p:cNvPr id="20" name="Picture 19">
             <a:extLst>
               <a:ext uri="{FF2B5EF4-FFF2-40B4-BE49-F238E27FC236}">
-                <a16:creationId xmlns:a16="http://schemas.microsoft.com/office/drawing/2014/main" id="{B20BCF63-08D7-4EF8-893D-BE7D2255880D}"/>
+                <a16:creationId xmlns:a16="http://schemas.microsoft.com/office/drawing/2014/main" id="{1614750A-1CD9-4EFB-B079-B7C3A55338D3}"/>
               </a:ext>
             </a:extLst>
           </p:cNvPr>
-          <p:cNvSpPr>
-            <a:spLocks noGrp="1"/>
-          </p:cNvSpPr>
-          <p:nvPr>
-            <p:ph idx="1"/>
-          </p:nvPr>
-        </p:nvSpPr>
+          <p:cNvPicPr>
+            <a:picLocks noChangeAspect="1"/>
+          </p:cNvPicPr>
+          <p:nvPr/>
+        </p:nvPicPr>
+        <p:blipFill>
+          <a:blip r:embed="rId4"/>
+          <a:stretch>
+            <a:fillRect/>
+          </a:stretch>
+        </p:blipFill>
         <p:spPr>
           <a:xfrm>
-            <a:off x="762768" y="5324084"/>
-            <a:ext cx="4072141" cy="1157581"/>
+            <a:off x="3935267" y="1518383"/>
+            <a:ext cx="3693554" cy="2240859"/>
           </a:xfrm>
+          <a:prstGeom prst="rect">
+            <a:avLst/>
+          </a:prstGeom>
         </p:spPr>
-        <p:txBody>
-          <a:bodyPr/>
-          <a:lstStyle/>
-          <a:p>
-            <a:endParaRPr lang="zh-CN" altLang="en-US" dirty="0"/>
-          </a:p>
-        </p:txBody>
-      </p:sp>
+      </p:pic>
+      <p:pic>
+        <p:nvPicPr>
+          <p:cNvPr id="22" name="Picture 21">
+            <a:extLst>
+              <a:ext uri="{FF2B5EF4-FFF2-40B4-BE49-F238E27FC236}">
+                <a16:creationId xmlns:a16="http://schemas.microsoft.com/office/drawing/2014/main" id="{F0B00652-3C67-443D-8BCF-B6CC71F1A360}"/>
+              </a:ext>
+            </a:extLst>
+          </p:cNvPr>
+          <p:cNvPicPr>
+            <a:picLocks noChangeAspect="1"/>
+          </p:cNvPicPr>
+          <p:nvPr/>
+        </p:nvPicPr>
+        <p:blipFill>
+          <a:blip r:embed="rId5"/>
+          <a:stretch>
+            <a:fillRect/>
+          </a:stretch>
+        </p:blipFill>
+        <p:spPr>
+          <a:xfrm>
+            <a:off x="3935267" y="4299290"/>
+            <a:ext cx="3654962" cy="2263088"/>
+          </a:xfrm>
+          <a:prstGeom prst="rect">
+            <a:avLst/>
+          </a:prstGeom>
+        </p:spPr>
+      </p:pic>
+      <p:pic>
+        <p:nvPicPr>
+          <p:cNvPr id="24" name="Picture 23">
+            <a:extLst>
+              <a:ext uri="{FF2B5EF4-FFF2-40B4-BE49-F238E27FC236}">
+                <a16:creationId xmlns:a16="http://schemas.microsoft.com/office/drawing/2014/main" id="{17D274B8-6DF1-46AD-9DD7-9E7632ED2F46}"/>
+              </a:ext>
+            </a:extLst>
+          </p:cNvPr>
+          <p:cNvPicPr>
+            <a:picLocks noChangeAspect="1"/>
+          </p:cNvPicPr>
+          <p:nvPr/>
+        </p:nvPicPr>
+        <p:blipFill>
+          <a:blip r:embed="rId6"/>
+          <a:stretch>
+            <a:fillRect/>
+          </a:stretch>
+        </p:blipFill>
+        <p:spPr>
+          <a:xfrm>
+            <a:off x="7809107" y="1518383"/>
+            <a:ext cx="3641396" cy="2240859"/>
+          </a:xfrm>
+          <a:prstGeom prst="rect">
+            <a:avLst/>
+          </a:prstGeom>
+        </p:spPr>
+      </p:pic>
+      <p:pic>
+        <p:nvPicPr>
+          <p:cNvPr id="26" name="Picture 25">
+            <a:extLst>
+              <a:ext uri="{FF2B5EF4-FFF2-40B4-BE49-F238E27FC236}">
+                <a16:creationId xmlns:a16="http://schemas.microsoft.com/office/drawing/2014/main" id="{72310D4E-DE77-4CD3-8E0A-162AA233CE80}"/>
+              </a:ext>
+            </a:extLst>
+          </p:cNvPr>
+          <p:cNvPicPr>
+            <a:picLocks noChangeAspect="1"/>
+          </p:cNvPicPr>
+          <p:nvPr/>
+        </p:nvPicPr>
+        <p:blipFill>
+          <a:blip r:embed="rId7"/>
+          <a:stretch>
+            <a:fillRect/>
+          </a:stretch>
+        </p:blipFill>
+        <p:spPr>
+          <a:xfrm>
+            <a:off x="100019" y="4305206"/>
+            <a:ext cx="3654962" cy="2257172"/>
+          </a:xfrm>
+          <a:prstGeom prst="rect">
+            <a:avLst/>
+          </a:prstGeom>
+        </p:spPr>
+      </p:pic>
     </p:spTree>
     <p:extLst>
       <p:ext uri="{BB962C8B-B14F-4D97-AF65-F5344CB8AC3E}">
-        <p14:creationId xmlns:p14="http://schemas.microsoft.com/office/powerpoint/2010/main" val="1418613357"/>
+        <p14:creationId xmlns:p14="http://schemas.microsoft.com/office/powerpoint/2010/main" val="271426853"/>
       </p:ext>
     </p:extLst>
   </p:cSld>
@@ -7268,7 +7710,7 @@
           <p:cNvPr id="2" name="Title 1">
             <a:extLst>
               <a:ext uri="{FF2B5EF4-FFF2-40B4-BE49-F238E27FC236}">
-                <a16:creationId xmlns:a16="http://schemas.microsoft.com/office/drawing/2014/main" id="{5CA0080E-7511-4AC4-A8F0-C52C0455BA63}"/>
+                <a16:creationId xmlns:a16="http://schemas.microsoft.com/office/drawing/2014/main" id="{AAA023A3-C580-49F7-8ED6-A426CD016C0F}"/>
               </a:ext>
             </a:extLst>
           </p:cNvPr>
@@ -7281,8 +7723,8 @@
         </p:nvSpPr>
         <p:spPr>
           <a:xfrm>
-            <a:off x="490722" y="150013"/>
-            <a:ext cx="8596668" cy="1320800"/>
+            <a:off x="677333" y="376335"/>
+            <a:ext cx="10071531" cy="1320800"/>
           </a:xfrm>
         </p:spPr>
         <p:txBody>
@@ -7295,38 +7737,73 @@
                 <a:ea typeface="DengXian" panose="02010600030101010101" pitchFamily="2" charset="-122"/>
                 <a:cs typeface="Times New Roman" panose="02020603050405020304" pitchFamily="18" charset="0"/>
               </a:rPr>
-              <a:t>A</a:t>
-            </a:r>
-            <a:r>
-              <a:rPr lang="en-US" sz="3600" dirty="0">
-                <a:latin typeface="Calibri" panose="020F0502020204030204" pitchFamily="34" charset="0"/>
-                <a:ea typeface="DengXian" panose="02010600030101010101" pitchFamily="2" charset="-122"/>
-                <a:cs typeface="Times New Roman" panose="02020603050405020304" pitchFamily="18" charset="0"/>
-              </a:rPr>
-              <a:t>verage solar energy potential generated per panel by region – </a:t>
-            </a:r>
-            <a:r>
-              <a:rPr lang="en-US" dirty="0"/>
-              <a:t>Chart 4-8</a:t>
-            </a:r>
+              <a:t>Total </a:t>
+            </a:r>
+            <a:r>
+              <a:rPr lang="en-US" dirty="0">
+                <a:effectLst/>
+                <a:latin typeface="Calibri" panose="020F0502020204030204" pitchFamily="34" charset="0"/>
+                <a:ea typeface="DengXian" panose="02010600030101010101" pitchFamily="2" charset="-122"/>
+                <a:cs typeface="Times New Roman" panose="02020603050405020304" pitchFamily="18" charset="0"/>
+              </a:rPr>
+              <a:t>solar energy production potential by region – chart3 </a:t>
+            </a:r>
+            <a:r>
+              <a:rPr lang="en-US" dirty="0">
+                <a:solidFill>
+                  <a:srgbClr val="FFFF00"/>
+                </a:solidFill>
+                <a:effectLst/>
+                <a:latin typeface="Calibri" panose="020F0502020204030204" pitchFamily="34" charset="0"/>
+                <a:ea typeface="DengXian" panose="02010600030101010101" pitchFamily="2" charset="-122"/>
+                <a:cs typeface="Times New Roman" panose="02020603050405020304" pitchFamily="18" charset="0"/>
+              </a:rPr>
+              <a:t>(</a:t>
+            </a:r>
+            <a:r>
+              <a:rPr lang="en-US" dirty="0">
+                <a:solidFill>
+                  <a:srgbClr val="FFFF00"/>
+                </a:solidFill>
+                <a:latin typeface="Calibri" panose="020F0502020204030204" pitchFamily="34" charset="0"/>
+                <a:ea typeface="DengXian" panose="02010600030101010101" pitchFamily="2" charset="-122"/>
+                <a:cs typeface="Times New Roman" panose="02020603050405020304" pitchFamily="18" charset="0"/>
+              </a:rPr>
+              <a:t>Both of these two needed</a:t>
+            </a:r>
+            <a:r>
+              <a:rPr lang="en-US" dirty="0">
+                <a:solidFill>
+                  <a:srgbClr val="FFFF00"/>
+                </a:solidFill>
+                <a:effectLst/>
+                <a:latin typeface="Calibri" panose="020F0502020204030204" pitchFamily="34" charset="0"/>
+                <a:ea typeface="DengXian" panose="02010600030101010101" pitchFamily="2" charset="-122"/>
+                <a:cs typeface="Times New Roman" panose="02020603050405020304" pitchFamily="18" charset="0"/>
+              </a:rPr>
+              <a:t>)</a:t>
+            </a:r>
+            <a:endParaRPr lang="en-US" dirty="0">
+              <a:solidFill>
+                <a:srgbClr val="FFFF00"/>
+              </a:solidFill>
+            </a:endParaRPr>
           </a:p>
         </p:txBody>
       </p:sp>
       <p:pic>
         <p:nvPicPr>
-          <p:cNvPr id="9" name="Content Placeholder 8">
+          <p:cNvPr id="15" name="Picture 14">
             <a:extLst>
               <a:ext uri="{FF2B5EF4-FFF2-40B4-BE49-F238E27FC236}">
-                <a16:creationId xmlns:a16="http://schemas.microsoft.com/office/drawing/2014/main" id="{A260FDCF-1BE9-47F8-AAAA-E61A5251A1C0}"/>
+                <a16:creationId xmlns:a16="http://schemas.microsoft.com/office/drawing/2014/main" id="{1E29D9E2-0608-499B-BFA7-BE12F36FCCA3}"/>
               </a:ext>
             </a:extLst>
           </p:cNvPr>
           <p:cNvPicPr>
-            <a:picLocks noGrp="1" noChangeAspect="1"/>
+            <a:picLocks noChangeAspect="1"/>
           </p:cNvPicPr>
-          <p:nvPr>
-            <p:ph idx="1"/>
-          </p:nvPr>
+          <p:nvPr/>
         </p:nvPicPr>
         <p:blipFill>
           <a:blip r:embed="rId2"/>
@@ -7336,17 +7813,20 @@
         </p:blipFill>
         <p:spPr>
           <a:xfrm>
-            <a:off x="59277" y="4180131"/>
-            <a:ext cx="3992501" cy="2449527"/>
+            <a:off x="6199704" y="2286712"/>
+            <a:ext cx="5642538" cy="3519523"/>
           </a:xfrm>
+          <a:prstGeom prst="rect">
+            <a:avLst/>
+          </a:prstGeom>
         </p:spPr>
       </p:pic>
       <p:pic>
         <p:nvPicPr>
-          <p:cNvPr id="5" name="Picture 4">
+          <p:cNvPr id="17" name="Picture 16">
             <a:extLst>
               <a:ext uri="{FF2B5EF4-FFF2-40B4-BE49-F238E27FC236}">
-                <a16:creationId xmlns:a16="http://schemas.microsoft.com/office/drawing/2014/main" id="{CFDCA03D-E2EA-48E9-B886-492475873189}"/>
+                <a16:creationId xmlns:a16="http://schemas.microsoft.com/office/drawing/2014/main" id="{85239267-7266-4201-9FA5-3B409359A8A1}"/>
               </a:ext>
             </a:extLst>
           </p:cNvPr>
@@ -7363,128 +7843,8 @@
         </p:blipFill>
         <p:spPr>
           <a:xfrm>
-            <a:off x="59278" y="1665268"/>
-            <a:ext cx="3978181" cy="2449528"/>
-          </a:xfrm>
-          <a:prstGeom prst="rect">
-            <a:avLst/>
-          </a:prstGeom>
-        </p:spPr>
-      </p:pic>
-      <p:pic>
-        <p:nvPicPr>
-          <p:cNvPr id="7" name="Picture 6">
-            <a:extLst>
-              <a:ext uri="{FF2B5EF4-FFF2-40B4-BE49-F238E27FC236}">
-                <a16:creationId xmlns:a16="http://schemas.microsoft.com/office/drawing/2014/main" id="{39153F6A-22DD-421B-8678-9B88355ABE7C}"/>
-              </a:ext>
-            </a:extLst>
-          </p:cNvPr>
-          <p:cNvPicPr>
-            <a:picLocks noChangeAspect="1"/>
-          </p:cNvPicPr>
-          <p:nvPr/>
-        </p:nvPicPr>
-        <p:blipFill>
-          <a:blip r:embed="rId4"/>
-          <a:stretch>
-            <a:fillRect/>
-          </a:stretch>
-        </p:blipFill>
-        <p:spPr>
-          <a:xfrm>
-            <a:off x="4203764" y="1665268"/>
-            <a:ext cx="3992501" cy="2456216"/>
-          </a:xfrm>
-          <a:prstGeom prst="rect">
-            <a:avLst/>
-          </a:prstGeom>
-        </p:spPr>
-      </p:pic>
-      <p:pic>
-        <p:nvPicPr>
-          <p:cNvPr id="11" name="Picture 10">
-            <a:extLst>
-              <a:ext uri="{FF2B5EF4-FFF2-40B4-BE49-F238E27FC236}">
-                <a16:creationId xmlns:a16="http://schemas.microsoft.com/office/drawing/2014/main" id="{A91E4C0F-5C35-40D6-98DA-2D1481C67622}"/>
-              </a:ext>
-            </a:extLst>
-          </p:cNvPr>
-          <p:cNvPicPr>
-            <a:picLocks noChangeAspect="1"/>
-          </p:cNvPicPr>
-          <p:nvPr/>
-        </p:nvPicPr>
-        <p:blipFill>
-          <a:blip r:embed="rId5"/>
-          <a:stretch>
-            <a:fillRect/>
-          </a:stretch>
-        </p:blipFill>
-        <p:spPr>
-          <a:xfrm>
-            <a:off x="4203763" y="4180131"/>
-            <a:ext cx="4011335" cy="2478812"/>
-          </a:xfrm>
-          <a:prstGeom prst="rect">
-            <a:avLst/>
-          </a:prstGeom>
-        </p:spPr>
-      </p:pic>
-      <p:pic>
-        <p:nvPicPr>
-          <p:cNvPr id="13" name="Picture 12">
-            <a:extLst>
-              <a:ext uri="{FF2B5EF4-FFF2-40B4-BE49-F238E27FC236}">
-                <a16:creationId xmlns:a16="http://schemas.microsoft.com/office/drawing/2014/main" id="{9D19CABD-80F3-43A6-898F-15F088955EAC}"/>
-              </a:ext>
-            </a:extLst>
-          </p:cNvPr>
-          <p:cNvPicPr>
-            <a:picLocks noChangeAspect="1"/>
-          </p:cNvPicPr>
-          <p:nvPr/>
-        </p:nvPicPr>
-        <p:blipFill>
-          <a:blip r:embed="rId6"/>
-          <a:stretch>
-            <a:fillRect/>
-          </a:stretch>
-        </p:blipFill>
-        <p:spPr>
-          <a:xfrm>
-            <a:off x="8302629" y="2056972"/>
-            <a:ext cx="3830093" cy="2342806"/>
-          </a:xfrm>
-          <a:prstGeom prst="rect">
-            <a:avLst/>
-          </a:prstGeom>
-        </p:spPr>
-      </p:pic>
-      <p:pic>
-        <p:nvPicPr>
-          <p:cNvPr id="15" name="Picture 14">
-            <a:extLst>
-              <a:ext uri="{FF2B5EF4-FFF2-40B4-BE49-F238E27FC236}">
-                <a16:creationId xmlns:a16="http://schemas.microsoft.com/office/drawing/2014/main" id="{FC95E5A5-50A6-440C-A5AF-D691F8AA91E1}"/>
-              </a:ext>
-            </a:extLst>
-          </p:cNvPr>
-          <p:cNvPicPr>
-            <a:picLocks noChangeAspect="1"/>
-          </p:cNvPicPr>
-          <p:nvPr/>
-        </p:nvPicPr>
-        <p:blipFill>
-          <a:blip r:embed="rId7"/>
-          <a:stretch>
-            <a:fillRect/>
-          </a:stretch>
-        </p:blipFill>
-        <p:spPr>
-          <a:xfrm>
-            <a:off x="8302629" y="4595755"/>
-            <a:ext cx="3823585" cy="1058596"/>
+            <a:off x="403132" y="2286711"/>
+            <a:ext cx="5692868" cy="3519523"/>
           </a:xfrm>
           <a:prstGeom prst="rect">
             <a:avLst/>
@@ -7494,7 +7854,7 @@
     </p:spTree>
     <p:extLst>
       <p:ext uri="{BB962C8B-B14F-4D97-AF65-F5344CB8AC3E}">
-        <p14:creationId xmlns:p14="http://schemas.microsoft.com/office/powerpoint/2010/main" val="271426853"/>
+        <p14:creationId xmlns:p14="http://schemas.microsoft.com/office/powerpoint/2010/main" val="1418613357"/>
       </p:ext>
     </p:extLst>
   </p:cSld>
@@ -7989,10 +8349,9 @@
           <a:lstStyle/>
           <a:p>
             <a:r>
-              <a:rPr lang="en-US"/>
-              <a:t>Correlation checking</a:t>
-            </a:r>
-            <a:endParaRPr lang="en-US" dirty="0"/>
+              <a:rPr lang="en-US" dirty="0"/>
+              <a:t>Heatmap For Correlation Checking</a:t>
+            </a:r>
           </a:p>
         </p:txBody>
       </p:sp>
@@ -8043,10 +8402,10 @@
       </p:sp>
       <p:pic>
         <p:nvPicPr>
-          <p:cNvPr id="6" name="Picture 5" descr="Calendar&#10;&#10;Description automatically generated">
+          <p:cNvPr id="8" name="Picture 7">
             <a:extLst>
               <a:ext uri="{FF2B5EF4-FFF2-40B4-BE49-F238E27FC236}">
-                <a16:creationId xmlns:a16="http://schemas.microsoft.com/office/drawing/2014/main" id="{6AC56838-18F4-42BC-B009-004A6FA64DA0}"/>
+                <a16:creationId xmlns:a16="http://schemas.microsoft.com/office/drawing/2014/main" id="{12A1FF45-92DE-440E-9399-42C8B3A3DE1C}"/>
               </a:ext>
             </a:extLst>
           </p:cNvPr>
@@ -8063,8 +8422,8 @@
         </p:blipFill>
         <p:spPr>
           <a:xfrm>
-            <a:off x="1586202" y="1270000"/>
-            <a:ext cx="7296539" cy="5472404"/>
+            <a:off x="970115" y="1270000"/>
+            <a:ext cx="6048872" cy="5515313"/>
           </a:xfrm>
           <a:prstGeom prst="rect">
             <a:avLst/>
@@ -8357,7 +8716,7 @@
           <a:p>
             <a:r>
               <a:rPr lang="en-US" dirty="0"/>
-              <a:t>ANOVA: do the sunlight energy potential per panel per direction diff by region?</a:t>
+              <a:t>ANOVA: do the sunlight energy potential per panel per direction differ by region?</a:t>
             </a:r>
           </a:p>
         </p:txBody>
@@ -9652,7 +10011,7 @@
                 <a:latin typeface="Helvetica" panose="020B0604020202020204" pitchFamily="34" charset="0"/>
                 <a:cs typeface="Helvetica" panose="020B0604020202020204" pitchFamily="34" charset="0"/>
               </a:rPr>
-              <a:t>, contains the number of solar panels, along with the amount of solar energy generated and carbon dioxide abatement in different cities of United States.</a:t>
+              <a:t>, contains the estimated number of solar panels, amount of solar energy generated, and carbon dioxide abatement in cities throughout the United States.</a:t>
             </a:r>
           </a:p>
           <a:p>
@@ -9935,6 +10294,37 @@
               </a:rPr>
               <a:t> the estimated potential carbon offset from solar energy use per region.</a:t>
             </a:r>
+          </a:p>
+          <a:p>
+            <a:pPr algn="just">
+              <a:lnSpc>
+                <a:spcPct val="150000"/>
+              </a:lnSpc>
+            </a:pPr>
+            <a:r>
+              <a:rPr lang="en-US" altLang="zh-CN" sz="2000" dirty="0">
+                <a:solidFill>
+                  <a:schemeClr val="accent1">
+                    <a:lumMod val="40000"/>
+                    <a:lumOff val="60000"/>
+                  </a:schemeClr>
+                </a:solidFill>
+                <a:latin typeface="Helvetica" panose="020B0604020202020204" pitchFamily="34" charset="0"/>
+                <a:cs typeface="Helvetica" panose="020B0604020202020204" pitchFamily="34" charset="0"/>
+              </a:rPr>
+              <a:t>Compare</a:t>
+            </a:r>
+            <a:r>
+              <a:rPr lang="en-US" altLang="zh-CN" sz="2000" dirty="0">
+                <a:latin typeface="Helvetica" panose="020B0604020202020204" pitchFamily="34" charset="0"/>
+                <a:cs typeface="Helvetica" panose="020B0604020202020204" pitchFamily="34" charset="0"/>
+              </a:rPr>
+              <a:t> mean potential solar energy generation per panel by region.</a:t>
+            </a:r>
+            <a:endParaRPr lang="en-US" altLang="zh-CN" sz="2000" b="0" i="0" u="none" strike="noStrike" baseline="0" dirty="0">
+              <a:latin typeface="Helvetica" panose="020B0604020202020204" pitchFamily="34" charset="0"/>
+              <a:cs typeface="Helvetica" panose="020B0604020202020204" pitchFamily="34" charset="0"/>
+            </a:endParaRPr>
           </a:p>
           <a:p>
             <a:pPr marL="0" indent="0">

</xml_diff>